<commit_message>
full paper draft ready
</commit_message>
<xml_diff>
--- a/gender_talks.pptx
+++ b/gender_talks.pptx
@@ -3783,44 +3783,6 @@
           <a:chExt cx="0" cy="0"/>
         </a:xfrm>
       </p:grpSpPr>
-      <p:sp>
-        <p:nvSpPr>
-          <p:cNvPr id="2" name="Title 1"/>
-          <p:cNvSpPr>
-            <a:spLocks noGrp="1"/>
-          </p:cNvSpPr>
-          <p:nvPr>
-            <p:ph type="title"/>
-          </p:nvPr>
-        </p:nvSpPr>
-        <p:spPr/>
-        <p:txBody>
-          <a:bodyPr/>
-          <a:lstStyle/>
-          <a:p>
-            <a:endParaRPr lang="en-US"/>
-          </a:p>
-        </p:txBody>
-      </p:sp>
-      <p:sp>
-        <p:nvSpPr>
-          <p:cNvPr id="3" name="Content Placeholder 2"/>
-          <p:cNvSpPr>
-            <a:spLocks noGrp="1"/>
-          </p:cNvSpPr>
-          <p:nvPr>
-            <p:ph idx="1"/>
-          </p:nvPr>
-        </p:nvSpPr>
-        <p:spPr/>
-        <p:txBody>
-          <a:bodyPr/>
-          <a:lstStyle/>
-          <a:p>
-            <a:endParaRPr lang="en-US"/>
-          </a:p>
-        </p:txBody>
-      </p:sp>
       <p:pic>
         <p:nvPicPr>
           <p:cNvPr id="4" name="Picture 3" descr="all_ppl.png"/>
@@ -3888,44 +3850,6 @@
           <a:chExt cx="0" cy="0"/>
         </a:xfrm>
       </p:grpSpPr>
-      <p:sp>
-        <p:nvSpPr>
-          <p:cNvPr id="2" name="Title 1"/>
-          <p:cNvSpPr>
-            <a:spLocks noGrp="1"/>
-          </p:cNvSpPr>
-          <p:nvPr>
-            <p:ph type="title"/>
-          </p:nvPr>
-        </p:nvSpPr>
-        <p:spPr/>
-        <p:txBody>
-          <a:bodyPr/>
-          <a:lstStyle/>
-          <a:p>
-            <a:endParaRPr lang="en-US"/>
-          </a:p>
-        </p:txBody>
-      </p:sp>
-      <p:sp>
-        <p:nvSpPr>
-          <p:cNvPr id="3" name="Content Placeholder 2"/>
-          <p:cNvSpPr>
-            <a:spLocks noGrp="1"/>
-          </p:cNvSpPr>
-          <p:nvPr>
-            <p:ph idx="1"/>
-          </p:nvPr>
-        </p:nvSpPr>
-        <p:spPr/>
-        <p:txBody>
-          <a:bodyPr/>
-          <a:lstStyle/>
-          <a:p>
-            <a:endParaRPr lang="en-US"/>
-          </a:p>
-        </p:txBody>
-      </p:sp>
       <p:pic>
         <p:nvPicPr>
           <p:cNvPr id="4" name="Picture 3" descr="all_speaker.png"/>
@@ -4060,44 +3984,6 @@
           <a:chExt cx="0" cy="0"/>
         </a:xfrm>
       </p:grpSpPr>
-      <p:sp>
-        <p:nvSpPr>
-          <p:cNvPr id="2" name="Title 1"/>
-          <p:cNvSpPr>
-            <a:spLocks noGrp="1"/>
-          </p:cNvSpPr>
-          <p:nvPr>
-            <p:ph type="title"/>
-          </p:nvPr>
-        </p:nvSpPr>
-        <p:spPr/>
-        <p:txBody>
-          <a:bodyPr/>
-          <a:lstStyle/>
-          <a:p>
-            <a:endParaRPr lang="en-US"/>
-          </a:p>
-        </p:txBody>
-      </p:sp>
-      <p:sp>
-        <p:nvSpPr>
-          <p:cNvPr id="3" name="Content Placeholder 2"/>
-          <p:cNvSpPr>
-            <a:spLocks noGrp="1"/>
-          </p:cNvSpPr>
-          <p:nvPr>
-            <p:ph idx="1"/>
-          </p:nvPr>
-        </p:nvSpPr>
-        <p:spPr/>
-        <p:txBody>
-          <a:bodyPr/>
-          <a:lstStyle/>
-          <a:p>
-            <a:endParaRPr lang="en-US"/>
-          </a:p>
-        </p:txBody>
-      </p:sp>
       <p:pic>
         <p:nvPicPr>
           <p:cNvPr id="4" name="Picture 3" descr="all_questions.png"/>
@@ -4165,44 +4051,6 @@
           <a:chExt cx="0" cy="0"/>
         </a:xfrm>
       </p:grpSpPr>
-      <p:sp>
-        <p:nvSpPr>
-          <p:cNvPr id="2" name="Title 1"/>
-          <p:cNvSpPr>
-            <a:spLocks noGrp="1"/>
-          </p:cNvSpPr>
-          <p:nvPr>
-            <p:ph type="title"/>
-          </p:nvPr>
-        </p:nvSpPr>
-        <p:spPr/>
-        <p:txBody>
-          <a:bodyPr/>
-          <a:lstStyle/>
-          <a:p>
-            <a:endParaRPr lang="en-US"/>
-          </a:p>
-        </p:txBody>
-      </p:sp>
-      <p:sp>
-        <p:nvSpPr>
-          <p:cNvPr id="3" name="Content Placeholder 2"/>
-          <p:cNvSpPr>
-            <a:spLocks noGrp="1"/>
-          </p:cNvSpPr>
-          <p:nvPr>
-            <p:ph idx="1"/>
-          </p:nvPr>
-        </p:nvSpPr>
-        <p:spPr/>
-        <p:txBody>
-          <a:bodyPr/>
-          <a:lstStyle/>
-          <a:p>
-            <a:endParaRPr lang="en-US"/>
-          </a:p>
-        </p:txBody>
-      </p:sp>
       <p:pic>
         <p:nvPicPr>
           <p:cNvPr id="4" name="Picture 3" descr="one_question.png"/>

</xml_diff>